<commit_message>
Document Updated - adding realtime monitoring by SignalR
</commit_message>
<xml_diff>
--- a/docs/20170124_Microsoft_IoTHackfest_住友セメントシステム.pptx
+++ b/docs/20170124_Microsoft_IoTHackfest_住友セメントシステム.pptx
@@ -3826,7 +3826,7 @@
           <p:nvPr/>
         </p:nvPicPr>
         <p:blipFill>
-          <a:blip r:embed="rId14">
+          <a:blip r:embed="rId17">
             <a:biLevel thresh="25000"/>
             <a:extLst>
               <a:ext uri="{28A0092B-C50C-407E-A947-70E740481C1C}">
@@ -3857,7 +3857,7 @@
           <p:nvPr/>
         </p:nvPicPr>
         <p:blipFill>
-          <a:blip r:embed="rId15">
+          <a:blip r:embed="rId18">
             <a:biLevel thresh="25000"/>
             <a:extLst>
               <a:ext uri="{28A0092B-C50C-407E-A947-70E740481C1C}">
@@ -3888,7 +3888,7 @@
           <p:nvPr/>
         </p:nvPicPr>
         <p:blipFill>
-          <a:blip r:embed="rId16">
+          <a:blip r:embed="rId19">
             <a:biLevel thresh="25000"/>
             <a:extLst>
               <a:ext uri="{28A0092B-C50C-407E-A947-70E740481C1C}">
@@ -3919,7 +3919,7 @@
           <p:nvPr/>
         </p:nvPicPr>
         <p:blipFill>
-          <a:blip r:embed="rId17">
+          <a:blip r:embed="rId20">
             <a:biLevel thresh="25000"/>
             <a:extLst>
               <a:ext uri="{28A0092B-C50C-407E-A947-70E740481C1C}">
@@ -4053,7 +4053,7 @@
         </p:nvSpPr>
         <p:spPr>
           <a:xfrm>
-            <a:off x="5896426" y="4764705"/>
+            <a:off x="7546875" y="4841559"/>
             <a:ext cx="4221914" cy="488515"/>
           </a:xfrm>
           <a:prstGeom prst="rect">
@@ -4109,6 +4109,17 @@
                   <a:srgbClr val="000000"/>
                 </a:solidFill>
               </a:rPr>
+              <a:t>&lt;&lt;Status&gt;&gt;</a:t>
+            </a:r>
+          </a:p>
+          <a:p>
+            <a:pPr algn="ctr"/>
+            <a:r>
+              <a:rPr lang="en-US" altLang="ja-JP" sz="1200" dirty="0">
+                <a:solidFill>
+                  <a:srgbClr val="000000"/>
+                </a:solidFill>
+              </a:rPr>
               <a:t>Store/Notification to share status</a:t>
             </a:r>
             <a:endParaRPr kumimoji="1" lang="en-US" altLang="ja-JP" sz="1200" dirty="0">
@@ -4120,47 +4131,12 @@
           <a:p>
             <a:pPr algn="ctr"/>
             <a:r>
-              <a:rPr kumimoji="1" lang="en-US" altLang="ja-JP" sz="1200" dirty="0">
-                <a:solidFill>
-                  <a:srgbClr val="000000"/>
-                </a:solidFill>
-              </a:rPr>
-              <a:t>Status (Start-end)</a:t>
-            </a:r>
-          </a:p>
-          <a:p>
-            <a:pPr algn="ctr"/>
-            <a:r>
-              <a:rPr lang="ja-JP" altLang="en-US" sz="1200" dirty="0">
-                <a:solidFill>
-                  <a:srgbClr val="000000"/>
-                </a:solidFill>
-              </a:rPr>
-              <a:t>数量</a:t>
-            </a:r>
-            <a:r>
               <a:rPr lang="en-US" altLang="ja-JP" sz="1200" dirty="0">
                 <a:solidFill>
                   <a:srgbClr val="000000"/>
                 </a:solidFill>
               </a:rPr>
-              <a:t>-&gt;Mix-&gt;</a:t>
-            </a:r>
-            <a:r>
-              <a:rPr lang="ja-JP" altLang="en-US" sz="1200" dirty="0">
-                <a:solidFill>
-                  <a:srgbClr val="000000"/>
-                </a:solidFill>
-              </a:rPr>
-              <a:t>出庫</a:t>
-            </a:r>
-            <a:r>
-              <a:rPr lang="en-US" altLang="ja-JP" sz="1200" dirty="0">
-                <a:solidFill>
-                  <a:srgbClr val="000000"/>
-                </a:solidFill>
-              </a:rPr>
-              <a:t>-&gt;Print</a:t>
+              <a:t>Volume-&gt;Mix-&gt;Shipment-&gt;Print</a:t>
             </a:r>
           </a:p>
         </p:txBody>
@@ -4533,13 +4509,13 @@
           <p:nvPr/>
         </p:nvPicPr>
         <p:blipFill>
-          <a:blip r:embed="rId18">
+          <a:blip r:embed="rId21">
             <a:extLst>
               <a:ext uri="{28A0092B-C50C-407E-A947-70E740481C1C}">
                 <a14:useLocalDpi xmlns:a14="http://schemas.microsoft.com/office/drawing/2010/main" val="0"/>
               </a:ext>
               <a:ext uri="{96DAC541-7B7A-43D3-8B79-37D633B846F1}">
-                <asvg:svgBlip xmlns:asvg="http://schemas.microsoft.com/office/drawing/2016/SVG/main" r:embed="rId19"/>
+                <asvg:svgBlip xmlns:asvg="http://schemas.microsoft.com/office/drawing/2016/SVG/main" r:embed="rId22"/>
               </a:ext>
             </a:extLst>
           </a:blip>
@@ -4715,13 +4691,13 @@
           <p:nvPr/>
         </p:nvPicPr>
         <p:blipFill>
-          <a:blip r:embed="rId20">
+          <a:blip r:embed="rId23">
             <a:extLst>
               <a:ext uri="{28A0092B-C50C-407E-A947-70E740481C1C}">
                 <a14:useLocalDpi xmlns:a14="http://schemas.microsoft.com/office/drawing/2010/main" val="0"/>
               </a:ext>
               <a:ext uri="{96DAC541-7B7A-43D3-8B79-37D633B846F1}">
-                <asvg:svgBlip xmlns:asvg="http://schemas.microsoft.com/office/drawing/2016/SVG/main" r:embed="rId21"/>
+                <asvg:svgBlip xmlns:asvg="http://schemas.microsoft.com/office/drawing/2016/SVG/main" r:embed="rId24"/>
               </a:ext>
             </a:extLst>
           </a:blip>
@@ -4909,7 +4885,7 @@
           <p:nvPr/>
         </p:nvPicPr>
         <p:blipFill>
-          <a:blip r:embed="rId22">
+          <a:blip r:embed="rId25">
             <a:biLevel thresh="25000"/>
             <a:extLst>
               <a:ext uri="{28A0092B-C50C-407E-A947-70E740481C1C}">
@@ -4940,7 +4916,7 @@
           <p:nvPr/>
         </p:nvPicPr>
         <p:blipFill>
-          <a:blip r:embed="rId23">
+          <a:blip r:embed="rId26">
             <a:biLevel thresh="25000"/>
             <a:extLst>
               <a:ext uri="{28A0092B-C50C-407E-A947-70E740481C1C}">
@@ -5098,7 +5074,7 @@
           <p:nvPr/>
         </p:nvPicPr>
         <p:blipFill>
-          <a:blip r:embed="rId24">
+          <a:blip r:embed="rId27">
             <a:biLevel thresh="25000"/>
             <a:extLst>
               <a:ext uri="{28A0092B-C50C-407E-A947-70E740481C1C}">
@@ -5129,7 +5105,7 @@
           <p:nvPr/>
         </p:nvPicPr>
         <p:blipFill>
-          <a:blip r:embed="rId25">
+          <a:blip r:embed="rId28">
             <a:biLevel thresh="25000"/>
             <a:extLst>
               <a:ext uri="{28A0092B-C50C-407E-A947-70E740481C1C}">
@@ -5317,6 +5293,248 @@
           </a:fontRef>
         </p:style>
       </p:cxnSp>
+      <p:sp>
+        <p:nvSpPr>
+          <p:cNvPr id="2" name="正方形/長方形 1"/>
+          <p:cNvSpPr/>
+          <p:nvPr>
+            <p:custDataLst>
+              <p:tags r:id="rId13"/>
+            </p:custDataLst>
+          </p:nvPr>
+        </p:nvSpPr>
+        <p:spPr>
+          <a:xfrm>
+            <a:off x="6854626" y="1940436"/>
+            <a:ext cx="1526042" cy="307939"/>
+          </a:xfrm>
+          <a:prstGeom prst="rect">
+            <a:avLst/>
+          </a:prstGeom>
+          <a:solidFill>
+            <a:srgbClr val="FFF100"/>
+          </a:solidFill>
+          <a:ln w="12700" cap="flat" cmpd="sng" algn="ctr">
+            <a:noFill/>
+            <a:prstDash val="solid"/>
+            <a:miter lim="800000"/>
+          </a:ln>
+          <a:effectLst/>
+          <a:extLst>
+            <a:ext uri="{91240B29-F687-4F45-9708-019B960494DF}">
+              <a14:hiddenLine xmlns:a14="http://schemas.microsoft.com/office/drawing/2010/main" w="12700" cap="flat" cmpd="sng" algn="ctr">
+                <a:solidFill>
+                  <a:schemeClr val="accent1">
+                    <a:shade val="50000"/>
+                  </a:schemeClr>
+                </a:solidFill>
+                <a:prstDash val="solid"/>
+                <a:miter lim="800000"/>
+              </a14:hiddenLine>
+            </a:ext>
+          </a:extLst>
+        </p:spPr>
+        <p:style>
+          <a:lnRef idx="2">
+            <a:schemeClr val="accent1">
+              <a:shade val="50000"/>
+            </a:schemeClr>
+          </a:lnRef>
+          <a:fillRef idx="1">
+            <a:schemeClr val="accent1"/>
+          </a:fillRef>
+          <a:effectRef idx="0">
+            <a:schemeClr val="accent1"/>
+          </a:effectRef>
+          <a:fontRef idx="minor">
+            <a:schemeClr val="lt1"/>
+          </a:fontRef>
+        </p:style>
+        <p:txBody>
+          <a:bodyPr rtlCol="0" anchor="ctr"/>
+          <a:lstStyle/>
+          <a:p>
+            <a:pPr algn="ctr"/>
+            <a:r>
+              <a:rPr kumimoji="1" lang="en-US" altLang="ja-JP" dirty="0">
+                <a:solidFill>
+                  <a:srgbClr val="000000"/>
+                </a:solidFill>
+              </a:rPr>
+              <a:t>Command</a:t>
+            </a:r>
+            <a:endParaRPr kumimoji="1" lang="ja-JP" altLang="en-US" dirty="0">
+              <a:solidFill>
+                <a:srgbClr val="000000"/>
+              </a:solidFill>
+            </a:endParaRPr>
+          </a:p>
+        </p:txBody>
+      </p:sp>
+      <p:sp>
+        <p:nvSpPr>
+          <p:cNvPr id="44" name="正方形/長方形 43"/>
+          <p:cNvSpPr/>
+          <p:nvPr>
+            <p:custDataLst>
+              <p:tags r:id="rId14"/>
+            </p:custDataLst>
+          </p:nvPr>
+        </p:nvSpPr>
+        <p:spPr>
+          <a:xfrm>
+            <a:off x="7523541" y="2969921"/>
+            <a:ext cx="1526042" cy="307939"/>
+          </a:xfrm>
+          <a:prstGeom prst="rect">
+            <a:avLst/>
+          </a:prstGeom>
+          <a:solidFill>
+            <a:srgbClr val="FF8C00"/>
+          </a:solidFill>
+          <a:ln w="12700" cap="flat" cmpd="sng" algn="ctr">
+            <a:noFill/>
+            <a:prstDash val="solid"/>
+            <a:miter lim="800000"/>
+          </a:ln>
+          <a:effectLst/>
+          <a:extLst>
+            <a:ext uri="{91240B29-F687-4F45-9708-019B960494DF}">
+              <a14:hiddenLine xmlns:a14="http://schemas.microsoft.com/office/drawing/2010/main" w="12700" cap="flat" cmpd="sng" algn="ctr">
+                <a:solidFill>
+                  <a:schemeClr val="accent1">
+                    <a:shade val="50000"/>
+                  </a:schemeClr>
+                </a:solidFill>
+                <a:prstDash val="solid"/>
+                <a:miter lim="800000"/>
+              </a14:hiddenLine>
+            </a:ext>
+          </a:extLst>
+        </p:spPr>
+        <p:style>
+          <a:lnRef idx="2">
+            <a:schemeClr val="accent1">
+              <a:shade val="50000"/>
+            </a:schemeClr>
+          </a:lnRef>
+          <a:fillRef idx="1">
+            <a:schemeClr val="accent1"/>
+          </a:fillRef>
+          <a:effectRef idx="0">
+            <a:schemeClr val="accent1"/>
+          </a:effectRef>
+          <a:fontRef idx="minor">
+            <a:schemeClr val="lt1"/>
+          </a:fontRef>
+        </p:style>
+        <p:txBody>
+          <a:bodyPr rtlCol="0" anchor="ctr"/>
+          <a:lstStyle/>
+          <a:p>
+            <a:pPr algn="ctr"/>
+            <a:r>
+              <a:rPr kumimoji="1" lang="en-US" altLang="ja-JP" dirty="0">
+                <a:solidFill>
+                  <a:srgbClr val="000000"/>
+                </a:solidFill>
+              </a:rPr>
+              <a:t>Status</a:t>
+            </a:r>
+            <a:endParaRPr kumimoji="1" lang="ja-JP" altLang="en-US" dirty="0">
+              <a:solidFill>
+                <a:srgbClr val="000000"/>
+              </a:solidFill>
+            </a:endParaRPr>
+          </a:p>
+        </p:txBody>
+      </p:sp>
+      <p:sp>
+        <p:nvSpPr>
+          <p:cNvPr id="45" name="正方形/長方形 44"/>
+          <p:cNvSpPr/>
+          <p:nvPr>
+            <p:custDataLst>
+              <p:tags r:id="rId15"/>
+            </p:custDataLst>
+          </p:nvPr>
+        </p:nvSpPr>
+        <p:spPr>
+          <a:xfrm>
+            <a:off x="5641515" y="4121988"/>
+            <a:ext cx="1095293" cy="1019754"/>
+          </a:xfrm>
+          <a:prstGeom prst="rect">
+            <a:avLst/>
+          </a:prstGeom>
+          <a:solidFill>
+            <a:srgbClr val="505050"/>
+          </a:solidFill>
+          <a:ln w="12700" cap="flat" cmpd="sng" algn="ctr">
+            <a:noFill/>
+            <a:prstDash val="solid"/>
+            <a:miter lim="800000"/>
+          </a:ln>
+          <a:effectLst/>
+          <a:extLst>
+            <a:ext uri="{91240B29-F687-4F45-9708-019B960494DF}">
+              <a14:hiddenLine xmlns:a14="http://schemas.microsoft.com/office/drawing/2010/main" w="12700" cap="flat" cmpd="sng" algn="ctr">
+                <a:solidFill>
+                  <a:schemeClr val="accent1">
+                    <a:shade val="50000"/>
+                  </a:schemeClr>
+                </a:solidFill>
+                <a:prstDash val="solid"/>
+                <a:miter lim="800000"/>
+              </a14:hiddenLine>
+            </a:ext>
+          </a:extLst>
+        </p:spPr>
+        <p:style>
+          <a:lnRef idx="2">
+            <a:schemeClr val="accent1">
+              <a:shade val="50000"/>
+            </a:schemeClr>
+          </a:lnRef>
+          <a:fillRef idx="1">
+            <a:schemeClr val="accent1"/>
+          </a:fillRef>
+          <a:effectRef idx="0">
+            <a:schemeClr val="accent1"/>
+          </a:effectRef>
+          <a:fontRef idx="minor">
+            <a:schemeClr val="lt1"/>
+          </a:fontRef>
+        </p:style>
+        <p:txBody>
+          <a:bodyPr rtlCol="0" anchor="ctr"/>
+          <a:lstStyle/>
+          <a:p>
+            <a:pPr algn="ctr"/>
+            <a:r>
+              <a:rPr kumimoji="1" lang="en-US" altLang="ja-JP" dirty="0">
+                <a:solidFill>
+                  <a:srgbClr val="FFFFFF"/>
+                </a:solidFill>
+              </a:rPr>
+              <a:t>Referral data </a:t>
+            </a:r>
+            <a:r>
+              <a:rPr kumimoji="1" lang="en-US" altLang="ja-JP" dirty="0" err="1">
+                <a:solidFill>
+                  <a:srgbClr val="FFFFFF"/>
+                </a:solidFill>
+              </a:rPr>
+              <a:t>Processs</a:t>
+            </a:r>
+            <a:endParaRPr kumimoji="1" lang="ja-JP" altLang="en-US" dirty="0">
+              <a:solidFill>
+                <a:srgbClr val="FFFFFF"/>
+              </a:solidFill>
+            </a:endParaRPr>
+          </a:p>
+        </p:txBody>
+      </p:sp>
     </p:spTree>
     <p:extLst>
       <p:ext uri="{BB962C8B-B14F-4D97-AF65-F5344CB8AC3E}">
@@ -5349,6 +5567,24 @@
 </file>
 
 <file path=ppt/tags/tag12.xml><?xml version="1.0" encoding="utf-8"?>
+<p:tagLst xmlns:a="http://schemas.openxmlformats.org/drawingml/2006/main" xmlns:r="http://schemas.openxmlformats.org/officeDocument/2006/relationships" xmlns:p="http://schemas.openxmlformats.org/presentationml/2006/main">
+  <p:tag name="MT_TILE" val="YES"/>
+</p:tagLst>
+</file>
+
+<file path=ppt/tags/tag13.xml><?xml version="1.0" encoding="utf-8"?>
+<p:tagLst xmlns:a="http://schemas.openxmlformats.org/drawingml/2006/main" xmlns:r="http://schemas.openxmlformats.org/officeDocument/2006/relationships" xmlns:p="http://schemas.openxmlformats.org/presentationml/2006/main">
+  <p:tag name="MT_TILE" val="YES"/>
+</p:tagLst>
+</file>
+
+<file path=ppt/tags/tag14.xml><?xml version="1.0" encoding="utf-8"?>
+<p:tagLst xmlns:a="http://schemas.openxmlformats.org/drawingml/2006/main" xmlns:r="http://schemas.openxmlformats.org/officeDocument/2006/relationships" xmlns:p="http://schemas.openxmlformats.org/presentationml/2006/main">
+  <p:tag name="MT_TILE" val="YES"/>
+</p:tagLst>
+</file>
+
+<file path=ppt/tags/tag15.xml><?xml version="1.0" encoding="utf-8"?>
 <p:tagLst xmlns:a="http://schemas.openxmlformats.org/drawingml/2006/main" xmlns:r="http://schemas.openxmlformats.org/officeDocument/2006/relationships" xmlns:p="http://schemas.openxmlformats.org/presentationml/2006/main">
   <p:tag name="MT_TILE" val="YES"/>
 </p:tagLst>

</xml_diff>